<commit_message>
final ppt with all links inserted
</commit_message>
<xml_diff>
--- a/Karasuno Doceree-Machine Learning Hackathon.pptx
+++ b/Karasuno Doceree-Machine Learning Hackathon.pptx
@@ -270,7 +270,7 @@
       </p15:sldGuideLst>
     </p:ext>
     <p:ext uri="GoogleSlidesCustomDataVersion2">
-      <go:slidesCustomData xmlns:go="http://customooxmlschemas.google.com/" r:id="rId15" roundtripDataSignature="AMtx7mjmsAABZaITZvPvo28l1FVp4RlPew=="/>
+      <go:slidesCustomData xmlns:go="http://customooxmlschemas.google.com/" r:id="rId15" roundtripDataSignature="AMtx7miQGCeQls018/rCvvC/QOy5LWt36A=="/>
     </p:ext>
   </p:extLst>
 </p:presentation>
@@ -1400,7 +1400,7 @@
   <p:cSld>
     <p:spTree>
       <p:nvGrpSpPr>
-        <p:cNvPr id="136" name="Shape 136"/>
+        <p:cNvPr id="137" name="Shape 137"/>
         <p:cNvGrpSpPr/>
         <p:nvPr/>
       </p:nvGrpSpPr>
@@ -1414,7 +1414,7 @@
       </p:grpSpPr>
       <p:sp>
         <p:nvSpPr>
-          <p:cNvPr id="137" name="Google Shape;137;p8:notes"/>
+          <p:cNvPr id="138" name="Google Shape;138;p8:notes"/>
           <p:cNvSpPr txBox="1"/>
           <p:nvPr>
             <p:ph idx="1" type="body"/>
@@ -1453,7 +1453,7 @@
       </p:sp>
       <p:sp>
         <p:nvSpPr>
-          <p:cNvPr id="138" name="Google Shape;138;p8:notes"/>
+          <p:cNvPr id="139" name="Google Shape;139;p8:notes"/>
           <p:cNvSpPr/>
           <p:nvPr>
             <p:ph idx="2" type="sldImg"/>
@@ -13028,6 +13028,53 @@
           </a:p>
         </p:txBody>
       </p:sp>
+      <p:sp>
+        <p:nvSpPr>
+          <p:cNvPr id="136" name="Google Shape;136;p6"/>
+          <p:cNvSpPr txBox="1"/>
+          <p:nvPr/>
+        </p:nvSpPr>
+        <p:spPr>
+          <a:xfrm>
+            <a:off x="753600" y="3030925"/>
+            <a:ext cx="4882200" cy="538800"/>
+          </a:xfrm>
+          <a:prstGeom prst="rect">
+            <a:avLst/>
+          </a:prstGeom>
+          <a:noFill/>
+          <a:ln>
+            <a:noFill/>
+          </a:ln>
+        </p:spPr>
+        <p:txBody>
+          <a:bodyPr anchorCtr="0" anchor="t" bIns="91425" lIns="91425" spcFirstLastPara="1" rIns="91425" wrap="square" tIns="91425">
+            <a:spAutoFit/>
+          </a:bodyPr>
+          <a:lstStyle/>
+          <a:p>
+            <a:pPr indent="0" lvl="0" marL="0" rtl="0" algn="l">
+              <a:spcBef>
+                <a:spcPts val="0"/>
+              </a:spcBef>
+              <a:spcAft>
+                <a:spcPts val="0"/>
+              </a:spcAft>
+              <a:buNone/>
+            </a:pPr>
+            <a:r>
+              <a:rPr lang="en-US" sz="2300" u="sng">
+                <a:solidFill>
+                  <a:schemeClr val="hlink"/>
+                </a:solidFill>
+                <a:hlinkClick r:id="rId6"/>
+              </a:rPr>
+              <a:t>Doceree Karasuno Zip file link</a:t>
+            </a:r>
+            <a:endParaRPr sz="2300"/>
+          </a:p>
+        </p:txBody>
+      </p:sp>
     </p:spTree>
   </p:cSld>
   <p:clrMapOvr>
@@ -13041,7 +13088,7 @@
   <p:cSld>
     <p:spTree>
       <p:nvGrpSpPr>
-        <p:cNvPr id="139" name="Shape 139"/>
+        <p:cNvPr id="140" name="Shape 140"/>
         <p:cNvGrpSpPr/>
         <p:nvPr/>
       </p:nvGrpSpPr>
@@ -13055,7 +13102,7 @@
       </p:grpSpPr>
       <p:sp>
         <p:nvSpPr>
-          <p:cNvPr id="140" name="Google Shape;140;p8"/>
+          <p:cNvPr id="141" name="Google Shape;141;p8"/>
           <p:cNvSpPr txBox="1"/>
           <p:nvPr>
             <p:ph type="title"/>
@@ -13114,7 +13161,7 @@
       </p:sp>
       <p:pic>
         <p:nvPicPr>
-          <p:cNvPr descr="Doceree_logo.png" id="141" name="Google Shape;141;p8"/>
+          <p:cNvPr descr="Doceree_logo.png" id="142" name="Google Shape;142;p8"/>
           <p:cNvPicPr preferRelativeResize="0"/>
           <p:nvPr/>
         </p:nvPicPr>
@@ -13141,7 +13188,7 @@
       </p:pic>
       <p:pic>
         <p:nvPicPr>
-          <p:cNvPr descr="CG-2023-logo.png" id="142" name="Google Shape;142;p8"/>
+          <p:cNvPr descr="CG-2023-logo.png" id="143" name="Google Shape;143;p8"/>
           <p:cNvPicPr preferRelativeResize="0"/>
           <p:nvPr/>
         </p:nvPicPr>
@@ -13175,6 +13222,285 @@
 </file>
 
 <file path=ppt/theme/theme1.xml><?xml version="1.0" encoding="utf-8"?>
+<a:theme xmlns:a="http://schemas.openxmlformats.org/drawingml/2006/main" xmlns:r="http://schemas.openxmlformats.org/officeDocument/2006/relationships">
+  <a:themeElements>
+    <a:clrScheme name="Default">
+      <a:dk1>
+        <a:srgbClr val="000000"/>
+      </a:dk1>
+      <a:lt1>
+        <a:srgbClr val="FFFFFF"/>
+      </a:lt1>
+      <a:dk2>
+        <a:srgbClr val="158158"/>
+      </a:dk2>
+      <a:lt2>
+        <a:srgbClr val="F3F3F3"/>
+      </a:lt2>
+      <a:accent1>
+        <a:srgbClr val="058DC7"/>
+      </a:accent1>
+      <a:accent2>
+        <a:srgbClr val="50B432"/>
+      </a:accent2>
+      <a:accent3>
+        <a:srgbClr val="ED561B"/>
+      </a:accent3>
+      <a:accent4>
+        <a:srgbClr val="EDEF00"/>
+      </a:accent4>
+      <a:accent5>
+        <a:srgbClr val="24CBE5"/>
+      </a:accent5>
+      <a:accent6>
+        <a:srgbClr val="64E572"/>
+      </a:accent6>
+      <a:hlink>
+        <a:srgbClr val="2200CC"/>
+      </a:hlink>
+      <a:folHlink>
+        <a:srgbClr val="551A8B"/>
+      </a:folHlink>
+    </a:clrScheme>
+    <a:fontScheme name="Office">
+      <a:majorFont>
+        <a:latin typeface="Arial"/>
+        <a:ea typeface=""/>
+        <a:cs typeface=""/>
+        <a:font script="Jpan" typeface="ＭＳ Ｐゴシック"/>
+        <a:font script="Hang" typeface="맑은 고딕"/>
+        <a:font script="Hans" typeface="宋体"/>
+        <a:font script="Hant" typeface="新細明體"/>
+        <a:font script="Arab" typeface="Times New Roman"/>
+        <a:font script="Hebr" typeface="Times New Roman"/>
+        <a:font script="Thai" typeface="Angsana New"/>
+        <a:font script="Ethi" typeface="Nyala"/>
+        <a:font script="Beng" typeface="Vrinda"/>
+        <a:font script="Gujr" typeface="Shruti"/>
+        <a:font script="Khmr" typeface="MoolBoran"/>
+        <a:font script="Knda" typeface="Tunga"/>
+        <a:font script="Guru" typeface="Raavi"/>
+        <a:font script="Cans" typeface="Euphemia"/>
+        <a:font script="Cher" typeface="Plantagenet Cherokee"/>
+        <a:font script="Yiii" typeface="Microsoft Yi Baiti"/>
+        <a:font script="Tibt" typeface="Microsoft Himalaya"/>
+        <a:font script="Thaa" typeface="MV Boli"/>
+        <a:font script="Deva" typeface="Mangal"/>
+        <a:font script="Telu" typeface="Gautami"/>
+        <a:font script="Taml" typeface="Latha"/>
+        <a:font script="Syrc" typeface="Estrangelo Edessa"/>
+        <a:font script="Orya" typeface="Kalinga"/>
+        <a:font script="Mlym" typeface="Kartika"/>
+        <a:font script="Laoo" typeface="DokChampa"/>
+        <a:font script="Sinh" typeface="Iskoola Pota"/>
+        <a:font script="Mong" typeface="Mongolian Baiti"/>
+        <a:font script="Viet" typeface="Times New Roman"/>
+        <a:font script="Uigh" typeface="Microsoft Uighur"/>
+        <a:font script="Geor" typeface="Sylfaen"/>
+      </a:majorFont>
+      <a:minorFont>
+        <a:latin typeface="Arial"/>
+        <a:ea typeface=""/>
+        <a:cs typeface=""/>
+        <a:font script="Jpan" typeface="ＭＳ Ｐゴシック"/>
+        <a:font script="Hang" typeface="맑은 고딕"/>
+        <a:font script="Hans" typeface="宋体"/>
+        <a:font script="Hant" typeface="新細明體"/>
+        <a:font script="Arab" typeface="Arial"/>
+        <a:font script="Hebr" typeface="Arial"/>
+        <a:font script="Thai" typeface="Cordia New"/>
+        <a:font script="Ethi" typeface="Nyala"/>
+        <a:font script="Beng" typeface="Vrinda"/>
+        <a:font script="Gujr" typeface="Shruti"/>
+        <a:font script="Khmr" typeface="DaunPenh"/>
+        <a:font script="Knda" typeface="Tunga"/>
+        <a:font script="Guru" typeface="Raavi"/>
+        <a:font script="Cans" typeface="Euphemia"/>
+        <a:font script="Cher" typeface="Plantagenet Cherokee"/>
+        <a:font script="Yiii" typeface="Microsoft Yi Baiti"/>
+        <a:font script="Tibt" typeface="Microsoft Himalaya"/>
+        <a:font script="Thaa" typeface="MV Boli"/>
+        <a:font script="Deva" typeface="Mangal"/>
+        <a:font script="Telu" typeface="Gautami"/>
+        <a:font script="Taml" typeface="Latha"/>
+        <a:font script="Syrc" typeface="Estrangelo Edessa"/>
+        <a:font script="Orya" typeface="Kalinga"/>
+        <a:font script="Mlym" typeface="Kartika"/>
+        <a:font script="Laoo" typeface="DokChampa"/>
+        <a:font script="Sinh" typeface="Iskoola Pota"/>
+        <a:font script="Mong" typeface="Mongolian Baiti"/>
+        <a:font script="Viet" typeface="Arial"/>
+        <a:font script="Uigh" typeface="Microsoft Uighur"/>
+        <a:font script="Geor" typeface="Sylfaen"/>
+      </a:minorFont>
+    </a:fontScheme>
+    <a:fmtScheme name="Office">
+      <a:fillStyleLst>
+        <a:solidFill>
+          <a:schemeClr val="phClr"/>
+        </a:solidFill>
+        <a:gradFill rotWithShape="1">
+          <a:gsLst>
+            <a:gs pos="0">
+              <a:schemeClr val="phClr">
+                <a:tint val="50000"/>
+                <a:satMod val="300000"/>
+              </a:schemeClr>
+            </a:gs>
+            <a:gs pos="35000">
+              <a:schemeClr val="phClr">
+                <a:tint val="37000"/>
+                <a:satMod val="300000"/>
+              </a:schemeClr>
+            </a:gs>
+            <a:gs pos="100000">
+              <a:schemeClr val="phClr">
+                <a:tint val="15000"/>
+                <a:satMod val="350000"/>
+              </a:schemeClr>
+            </a:gs>
+          </a:gsLst>
+          <a:lin ang="16200000" scaled="1"/>
+        </a:gradFill>
+        <a:gradFill rotWithShape="1">
+          <a:gsLst>
+            <a:gs pos="0">
+              <a:schemeClr val="phClr">
+                <a:tint val="100000"/>
+                <a:shade val="100000"/>
+                <a:satMod val="130000"/>
+              </a:schemeClr>
+            </a:gs>
+            <a:gs pos="100000">
+              <a:schemeClr val="phClr">
+                <a:tint val="50000"/>
+                <a:shade val="100000"/>
+                <a:satMod val="350000"/>
+              </a:schemeClr>
+            </a:gs>
+          </a:gsLst>
+          <a:lin ang="16200000" scaled="0"/>
+        </a:gradFill>
+      </a:fillStyleLst>
+      <a:lnStyleLst>
+        <a:ln w="9525" cap="flat" cmpd="sng" algn="ctr">
+          <a:solidFill>
+            <a:schemeClr val="phClr">
+              <a:shade val="95000"/>
+              <a:satMod val="105000"/>
+            </a:schemeClr>
+          </a:solidFill>
+          <a:prstDash val="solid"/>
+        </a:ln>
+        <a:ln w="25400" cap="flat" cmpd="sng" algn="ctr">
+          <a:solidFill>
+            <a:schemeClr val="phClr"/>
+          </a:solidFill>
+          <a:prstDash val="solid"/>
+        </a:ln>
+        <a:ln w="38100" cap="flat" cmpd="sng" algn="ctr">
+          <a:solidFill>
+            <a:schemeClr val="phClr"/>
+          </a:solidFill>
+          <a:prstDash val="solid"/>
+        </a:ln>
+      </a:lnStyleLst>
+      <a:effectStyleLst>
+        <a:effectStyle>
+          <a:effectLst>
+            <a:outerShdw blurRad="40000" dist="20000" dir="5400000" rotWithShape="0">
+              <a:srgbClr val="000000">
+                <a:alpha val="38000"/>
+              </a:srgbClr>
+            </a:outerShdw>
+          </a:effectLst>
+        </a:effectStyle>
+        <a:effectStyle>
+          <a:effectLst>
+            <a:outerShdw blurRad="40000" dist="23000" dir="5400000" rotWithShape="0">
+              <a:srgbClr val="000000">
+                <a:alpha val="35000"/>
+              </a:srgbClr>
+            </a:outerShdw>
+          </a:effectLst>
+        </a:effectStyle>
+        <a:effectStyle>
+          <a:effectLst>
+            <a:outerShdw blurRad="40000" dist="23000" dir="5400000" rotWithShape="0">
+              <a:srgbClr val="000000">
+                <a:alpha val="35000"/>
+              </a:srgbClr>
+            </a:outerShdw>
+          </a:effectLst>
+          <a:scene3d>
+            <a:camera prst="orthographicFront">
+              <a:rot lat="0" lon="0" rev="0"/>
+            </a:camera>
+            <a:lightRig rig="threePt" dir="t">
+              <a:rot lat="0" lon="0" rev="1200000"/>
+            </a:lightRig>
+          </a:scene3d>
+          <a:sp3d>
+            <a:bevelT w="63500" h="25400"/>
+          </a:sp3d>
+        </a:effectStyle>
+      </a:effectStyleLst>
+      <a:bgFillStyleLst>
+        <a:solidFill>
+          <a:schemeClr val="phClr"/>
+        </a:solidFill>
+        <a:gradFill rotWithShape="1">
+          <a:gsLst>
+            <a:gs pos="0">
+              <a:schemeClr val="phClr">
+                <a:tint val="40000"/>
+                <a:satMod val="350000"/>
+              </a:schemeClr>
+            </a:gs>
+            <a:gs pos="40000">
+              <a:schemeClr val="phClr">
+                <a:tint val="45000"/>
+                <a:shade val="99000"/>
+                <a:satMod val="350000"/>
+              </a:schemeClr>
+            </a:gs>
+            <a:gs pos="100000">
+              <a:schemeClr val="phClr">
+                <a:shade val="20000"/>
+                <a:satMod val="255000"/>
+              </a:schemeClr>
+            </a:gs>
+          </a:gsLst>
+          <a:path path="circle">
+            <a:fillToRect l="50000" t="-80000" r="50000" b="180000"/>
+          </a:path>
+        </a:gradFill>
+        <a:gradFill rotWithShape="1">
+          <a:gsLst>
+            <a:gs pos="0">
+              <a:schemeClr val="phClr">
+                <a:tint val="80000"/>
+                <a:satMod val="300000"/>
+              </a:schemeClr>
+            </a:gs>
+            <a:gs pos="100000">
+              <a:schemeClr val="phClr">
+                <a:shade val="30000"/>
+                <a:satMod val="200000"/>
+              </a:schemeClr>
+            </a:gs>
+          </a:gsLst>
+          <a:path path="circle">
+            <a:fillToRect l="50000" t="50000" r="50000" b="50000"/>
+          </a:path>
+        </a:gradFill>
+      </a:bgFillStyleLst>
+    </a:fmtScheme>
+  </a:themeElements>
+</a:theme>
+</file>
+
+<file path=ppt/theme/theme2.xml><?xml version="1.0" encoding="utf-8"?>
 <a:theme xmlns:a="http://schemas.openxmlformats.org/drawingml/2006/main" xmlns:r="http://schemas.openxmlformats.org/officeDocument/2006/relationships" name="Office Theme">
   <a:themeElements>
     <a:clrScheme name="Office">
@@ -13451,283 +13777,4 @@
     </a:fmtScheme>
   </a:themeElements>
 </a:theme>
-</file>
-
-<file path=ppt/theme/theme2.xml><?xml version="1.0" encoding="utf-8"?>
-<a:theme xmlns:a="http://schemas.openxmlformats.org/drawingml/2006/main" xmlns:r="http://schemas.openxmlformats.org/officeDocument/2006/relationships">
-  <a:themeElements>
-    <a:clrScheme name="Default">
-      <a:dk1>
-        <a:srgbClr val="000000"/>
-      </a:dk1>
-      <a:lt1>
-        <a:srgbClr val="FFFFFF"/>
-      </a:lt1>
-      <a:dk2>
-        <a:srgbClr val="158158"/>
-      </a:dk2>
-      <a:lt2>
-        <a:srgbClr val="F3F3F3"/>
-      </a:lt2>
-      <a:accent1>
-        <a:srgbClr val="058DC7"/>
-      </a:accent1>
-      <a:accent2>
-        <a:srgbClr val="50B432"/>
-      </a:accent2>
-      <a:accent3>
-        <a:srgbClr val="ED561B"/>
-      </a:accent3>
-      <a:accent4>
-        <a:srgbClr val="EDEF00"/>
-      </a:accent4>
-      <a:accent5>
-        <a:srgbClr val="24CBE5"/>
-      </a:accent5>
-      <a:accent6>
-        <a:srgbClr val="64E572"/>
-      </a:accent6>
-      <a:hlink>
-        <a:srgbClr val="2200CC"/>
-      </a:hlink>
-      <a:folHlink>
-        <a:srgbClr val="551A8B"/>
-      </a:folHlink>
-    </a:clrScheme>
-    <a:fontScheme name="Office">
-      <a:majorFont>
-        <a:latin typeface="Arial"/>
-        <a:ea typeface=""/>
-        <a:cs typeface=""/>
-        <a:font script="Jpan" typeface="ＭＳ Ｐゴシック"/>
-        <a:font script="Hang" typeface="맑은 고딕"/>
-        <a:font script="Hans" typeface="宋体"/>
-        <a:font script="Hant" typeface="新細明體"/>
-        <a:font script="Arab" typeface="Times New Roman"/>
-        <a:font script="Hebr" typeface="Times New Roman"/>
-        <a:font script="Thai" typeface="Angsana New"/>
-        <a:font script="Ethi" typeface="Nyala"/>
-        <a:font script="Beng" typeface="Vrinda"/>
-        <a:font script="Gujr" typeface="Shruti"/>
-        <a:font script="Khmr" typeface="MoolBoran"/>
-        <a:font script="Knda" typeface="Tunga"/>
-        <a:font script="Guru" typeface="Raavi"/>
-        <a:font script="Cans" typeface="Euphemia"/>
-        <a:font script="Cher" typeface="Plantagenet Cherokee"/>
-        <a:font script="Yiii" typeface="Microsoft Yi Baiti"/>
-        <a:font script="Tibt" typeface="Microsoft Himalaya"/>
-        <a:font script="Thaa" typeface="MV Boli"/>
-        <a:font script="Deva" typeface="Mangal"/>
-        <a:font script="Telu" typeface="Gautami"/>
-        <a:font script="Taml" typeface="Latha"/>
-        <a:font script="Syrc" typeface="Estrangelo Edessa"/>
-        <a:font script="Orya" typeface="Kalinga"/>
-        <a:font script="Mlym" typeface="Kartika"/>
-        <a:font script="Laoo" typeface="DokChampa"/>
-        <a:font script="Sinh" typeface="Iskoola Pota"/>
-        <a:font script="Mong" typeface="Mongolian Baiti"/>
-        <a:font script="Viet" typeface="Times New Roman"/>
-        <a:font script="Uigh" typeface="Microsoft Uighur"/>
-        <a:font script="Geor" typeface="Sylfaen"/>
-      </a:majorFont>
-      <a:minorFont>
-        <a:latin typeface="Arial"/>
-        <a:ea typeface=""/>
-        <a:cs typeface=""/>
-        <a:font script="Jpan" typeface="ＭＳ Ｐゴシック"/>
-        <a:font script="Hang" typeface="맑은 고딕"/>
-        <a:font script="Hans" typeface="宋体"/>
-        <a:font script="Hant" typeface="新細明體"/>
-        <a:font script="Arab" typeface="Arial"/>
-        <a:font script="Hebr" typeface="Arial"/>
-        <a:font script="Thai" typeface="Cordia New"/>
-        <a:font script="Ethi" typeface="Nyala"/>
-        <a:font script="Beng" typeface="Vrinda"/>
-        <a:font script="Gujr" typeface="Shruti"/>
-        <a:font script="Khmr" typeface="DaunPenh"/>
-        <a:font script="Knda" typeface="Tunga"/>
-        <a:font script="Guru" typeface="Raavi"/>
-        <a:font script="Cans" typeface="Euphemia"/>
-        <a:font script="Cher" typeface="Plantagenet Cherokee"/>
-        <a:font script="Yiii" typeface="Microsoft Yi Baiti"/>
-        <a:font script="Tibt" typeface="Microsoft Himalaya"/>
-        <a:font script="Thaa" typeface="MV Boli"/>
-        <a:font script="Deva" typeface="Mangal"/>
-        <a:font script="Telu" typeface="Gautami"/>
-        <a:font script="Taml" typeface="Latha"/>
-        <a:font script="Syrc" typeface="Estrangelo Edessa"/>
-        <a:font script="Orya" typeface="Kalinga"/>
-        <a:font script="Mlym" typeface="Kartika"/>
-        <a:font script="Laoo" typeface="DokChampa"/>
-        <a:font script="Sinh" typeface="Iskoola Pota"/>
-        <a:font script="Mong" typeface="Mongolian Baiti"/>
-        <a:font script="Viet" typeface="Arial"/>
-        <a:font script="Uigh" typeface="Microsoft Uighur"/>
-        <a:font script="Geor" typeface="Sylfaen"/>
-      </a:minorFont>
-    </a:fontScheme>
-    <a:fmtScheme name="Office">
-      <a:fillStyleLst>
-        <a:solidFill>
-          <a:schemeClr val="phClr"/>
-        </a:solidFill>
-        <a:gradFill rotWithShape="1">
-          <a:gsLst>
-            <a:gs pos="0">
-              <a:schemeClr val="phClr">
-                <a:tint val="50000"/>
-                <a:satMod val="300000"/>
-              </a:schemeClr>
-            </a:gs>
-            <a:gs pos="35000">
-              <a:schemeClr val="phClr">
-                <a:tint val="37000"/>
-                <a:satMod val="300000"/>
-              </a:schemeClr>
-            </a:gs>
-            <a:gs pos="100000">
-              <a:schemeClr val="phClr">
-                <a:tint val="15000"/>
-                <a:satMod val="350000"/>
-              </a:schemeClr>
-            </a:gs>
-          </a:gsLst>
-          <a:lin ang="16200000" scaled="1"/>
-        </a:gradFill>
-        <a:gradFill rotWithShape="1">
-          <a:gsLst>
-            <a:gs pos="0">
-              <a:schemeClr val="phClr">
-                <a:tint val="100000"/>
-                <a:shade val="100000"/>
-                <a:satMod val="130000"/>
-              </a:schemeClr>
-            </a:gs>
-            <a:gs pos="100000">
-              <a:schemeClr val="phClr">
-                <a:tint val="50000"/>
-                <a:shade val="100000"/>
-                <a:satMod val="350000"/>
-              </a:schemeClr>
-            </a:gs>
-          </a:gsLst>
-          <a:lin ang="16200000" scaled="0"/>
-        </a:gradFill>
-      </a:fillStyleLst>
-      <a:lnStyleLst>
-        <a:ln w="9525" cap="flat" cmpd="sng" algn="ctr">
-          <a:solidFill>
-            <a:schemeClr val="phClr">
-              <a:shade val="95000"/>
-              <a:satMod val="105000"/>
-            </a:schemeClr>
-          </a:solidFill>
-          <a:prstDash val="solid"/>
-        </a:ln>
-        <a:ln w="25400" cap="flat" cmpd="sng" algn="ctr">
-          <a:solidFill>
-            <a:schemeClr val="phClr"/>
-          </a:solidFill>
-          <a:prstDash val="solid"/>
-        </a:ln>
-        <a:ln w="38100" cap="flat" cmpd="sng" algn="ctr">
-          <a:solidFill>
-            <a:schemeClr val="phClr"/>
-          </a:solidFill>
-          <a:prstDash val="solid"/>
-        </a:ln>
-      </a:lnStyleLst>
-      <a:effectStyleLst>
-        <a:effectStyle>
-          <a:effectLst>
-            <a:outerShdw blurRad="40000" dist="20000" dir="5400000" rotWithShape="0">
-              <a:srgbClr val="000000">
-                <a:alpha val="38000"/>
-              </a:srgbClr>
-            </a:outerShdw>
-          </a:effectLst>
-        </a:effectStyle>
-        <a:effectStyle>
-          <a:effectLst>
-            <a:outerShdw blurRad="40000" dist="23000" dir="5400000" rotWithShape="0">
-              <a:srgbClr val="000000">
-                <a:alpha val="35000"/>
-              </a:srgbClr>
-            </a:outerShdw>
-          </a:effectLst>
-        </a:effectStyle>
-        <a:effectStyle>
-          <a:effectLst>
-            <a:outerShdw blurRad="40000" dist="23000" dir="5400000" rotWithShape="0">
-              <a:srgbClr val="000000">
-                <a:alpha val="35000"/>
-              </a:srgbClr>
-            </a:outerShdw>
-          </a:effectLst>
-          <a:scene3d>
-            <a:camera prst="orthographicFront">
-              <a:rot lat="0" lon="0" rev="0"/>
-            </a:camera>
-            <a:lightRig rig="threePt" dir="t">
-              <a:rot lat="0" lon="0" rev="1200000"/>
-            </a:lightRig>
-          </a:scene3d>
-          <a:sp3d>
-            <a:bevelT w="63500" h="25400"/>
-          </a:sp3d>
-        </a:effectStyle>
-      </a:effectStyleLst>
-      <a:bgFillStyleLst>
-        <a:solidFill>
-          <a:schemeClr val="phClr"/>
-        </a:solidFill>
-        <a:gradFill rotWithShape="1">
-          <a:gsLst>
-            <a:gs pos="0">
-              <a:schemeClr val="phClr">
-                <a:tint val="40000"/>
-                <a:satMod val="350000"/>
-              </a:schemeClr>
-            </a:gs>
-            <a:gs pos="40000">
-              <a:schemeClr val="phClr">
-                <a:tint val="45000"/>
-                <a:shade val="99000"/>
-                <a:satMod val="350000"/>
-              </a:schemeClr>
-            </a:gs>
-            <a:gs pos="100000">
-              <a:schemeClr val="phClr">
-                <a:shade val="20000"/>
-                <a:satMod val="255000"/>
-              </a:schemeClr>
-            </a:gs>
-          </a:gsLst>
-          <a:path path="circle">
-            <a:fillToRect l="50000" t="-80000" r="50000" b="180000"/>
-          </a:path>
-        </a:gradFill>
-        <a:gradFill rotWithShape="1">
-          <a:gsLst>
-            <a:gs pos="0">
-              <a:schemeClr val="phClr">
-                <a:tint val="80000"/>
-                <a:satMod val="300000"/>
-              </a:schemeClr>
-            </a:gs>
-            <a:gs pos="100000">
-              <a:schemeClr val="phClr">
-                <a:shade val="30000"/>
-                <a:satMod val="200000"/>
-              </a:schemeClr>
-            </a:gs>
-          </a:gsLst>
-          <a:path path="circle">
-            <a:fillToRect l="50000" t="50000" r="50000" b="50000"/>
-          </a:path>
-        </a:gradFill>
-      </a:bgFillStyleLst>
-    </a:fmtScheme>
-  </a:themeElements>
-</a:theme>
 </file>
</xml_diff>